<commit_message>
slides for lesson 08
</commit_message>
<xml_diff>
--- a/docs/slides/lesson_08.pptx
+++ b/docs/slides/lesson_08.pptx
@@ -5,11 +5,20 @@
     <p:sldMasterId id="2147483648" r:id="rId1"/>
   </p:sldMasterIdLst>
   <p:notesMasterIdLst>
-    <p:notesMasterId r:id="rId4"/>
+    <p:notesMasterId r:id="rId13"/>
   </p:notesMasterIdLst>
   <p:sldIdLst>
     <p:sldId id="256" r:id="rId2"/>
     <p:sldId id="257" r:id="rId3"/>
+    <p:sldId id="258" r:id="rId4"/>
+    <p:sldId id="259" r:id="rId5"/>
+    <p:sldId id="261" r:id="rId6"/>
+    <p:sldId id="260" r:id="rId7"/>
+    <p:sldId id="262" r:id="rId8"/>
+    <p:sldId id="263" r:id="rId9"/>
+    <p:sldId id="264" r:id="rId10"/>
+    <p:sldId id="265" r:id="rId11"/>
+    <p:sldId id="266" r:id="rId12"/>
   </p:sldIdLst>
   <p:sldSz cx="12192000" cy="6858000"/>
   <p:notesSz cx="6858000" cy="9144000"/>
@@ -115,6 +124,15 @@
           <p14:sldIdLst>
             <p14:sldId id="256"/>
             <p14:sldId id="257"/>
+            <p14:sldId id="258"/>
+            <p14:sldId id="259"/>
+            <p14:sldId id="261"/>
+            <p14:sldId id="260"/>
+            <p14:sldId id="262"/>
+            <p14:sldId id="263"/>
+            <p14:sldId id="264"/>
+            <p14:sldId id="265"/>
+            <p14:sldId id="266"/>
           </p14:sldIdLst>
         </p14:section>
       </p14:sectionLst>
@@ -220,7 +238,7 @@
           <a:p>
             <a:fld id="{9B5B52BA-3295-0343-9E28-A260A811DD10}" type="datetimeFigureOut">
               <a:rPr lang="en-US" smtClean="0"/>
-              <a:t>1/1/2021</a:t>
+              <a:t>3/2/2021</a:t>
             </a:fld>
             <a:endParaRPr lang="en-US"/>
           </a:p>
@@ -571,6 +589,90 @@
 </p:notes>
 </file>
 
+<file path=ppt/notesSlides/notesSlide2.xml><?xml version="1.0" encoding="utf-8"?>
+<p:notes xmlns:a="http://schemas.openxmlformats.org/drawingml/2006/main" xmlns:r="http://schemas.openxmlformats.org/officeDocument/2006/relationships" xmlns:p="http://schemas.openxmlformats.org/presentationml/2006/main">
+  <p:cSld>
+    <p:spTree>
+      <p:nvGrpSpPr>
+        <p:cNvPr id="1" name=""/>
+        <p:cNvGrpSpPr/>
+        <p:nvPr/>
+      </p:nvGrpSpPr>
+      <p:grpSpPr>
+        <a:xfrm>
+          <a:off x="0" y="0"/>
+          <a:ext cx="0" cy="0"/>
+          <a:chOff x="0" y="0"/>
+          <a:chExt cx="0" cy="0"/>
+        </a:xfrm>
+      </p:grpSpPr>
+      <p:sp>
+        <p:nvSpPr>
+          <p:cNvPr id="2" name="Slide Image Placeholder 1"/>
+          <p:cNvSpPr>
+            <a:spLocks noGrp="1" noRot="1" noChangeAspect="1"/>
+          </p:cNvSpPr>
+          <p:nvPr>
+            <p:ph type="sldImg"/>
+          </p:nvPr>
+        </p:nvSpPr>
+        <p:spPr/>
+      </p:sp>
+      <p:sp>
+        <p:nvSpPr>
+          <p:cNvPr id="3" name="Notes Placeholder 2"/>
+          <p:cNvSpPr>
+            <a:spLocks noGrp="1"/>
+          </p:cNvSpPr>
+          <p:nvPr>
+            <p:ph type="body" idx="1"/>
+          </p:nvPr>
+        </p:nvSpPr>
+        <p:spPr/>
+        <p:txBody>
+          <a:bodyPr/>
+          <a:lstStyle/>
+          <a:p>
+            <a:endParaRPr lang="en-US" dirty="0"/>
+          </a:p>
+        </p:txBody>
+      </p:sp>
+      <p:sp>
+        <p:nvSpPr>
+          <p:cNvPr id="4" name="Slide Number Placeholder 3"/>
+          <p:cNvSpPr>
+            <a:spLocks noGrp="1"/>
+          </p:cNvSpPr>
+          <p:nvPr>
+            <p:ph type="sldNum" sz="quarter" idx="5"/>
+          </p:nvPr>
+        </p:nvSpPr>
+        <p:spPr/>
+        <p:txBody>
+          <a:bodyPr/>
+          <a:lstStyle/>
+          <a:p>
+            <a:fld id="{D6FB5A5B-CC88-B64A-8F56-0DBE0ACA83DE}" type="slidenum">
+              <a:rPr lang="en-US" smtClean="0"/>
+              <a:t>6</a:t>
+            </a:fld>
+            <a:endParaRPr lang="en-US"/>
+          </a:p>
+        </p:txBody>
+      </p:sp>
+    </p:spTree>
+    <p:extLst>
+      <p:ext uri="{BB962C8B-B14F-4D97-AF65-F5344CB8AC3E}">
+        <p14:creationId xmlns:p14="http://schemas.microsoft.com/office/powerpoint/2010/main" val="1005858518"/>
+      </p:ext>
+    </p:extLst>
+  </p:cSld>
+  <p:clrMapOvr>
+    <a:masterClrMapping/>
+  </p:clrMapOvr>
+</p:notes>
+</file>
+
 <file path=ppt/slideLayouts/slideLayout1.xml><?xml version="1.0" encoding="utf-8"?>
 <p:sldLayout xmlns:a="http://schemas.openxmlformats.org/drawingml/2006/main" xmlns:r="http://schemas.openxmlformats.org/officeDocument/2006/relationships" xmlns:p="http://schemas.openxmlformats.org/presentationml/2006/main" type="title" preserve="1">
   <p:cSld name="Title Slide">
@@ -700,7 +802,7 @@
           <a:p>
             <a:fld id="{04F1D4A2-813C-F741-B481-C92B3A596030}" type="datetimeFigureOut">
               <a:rPr lang="en-US" smtClean="0"/>
-              <a:t>1/1/2021</a:t>
+              <a:t>3/2/2021</a:t>
             </a:fld>
             <a:endParaRPr lang="en-US"/>
           </a:p>
@@ -868,7 +970,7 @@
           <a:p>
             <a:fld id="{04F1D4A2-813C-F741-B481-C92B3A596030}" type="datetimeFigureOut">
               <a:rPr lang="en-US" smtClean="0"/>
-              <a:t>1/1/2021</a:t>
+              <a:t>3/2/2021</a:t>
             </a:fld>
             <a:endParaRPr lang="en-US"/>
           </a:p>
@@ -1046,7 +1148,7 @@
           <a:p>
             <a:fld id="{04F1D4A2-813C-F741-B481-C92B3A596030}" type="datetimeFigureOut">
               <a:rPr lang="en-US" smtClean="0"/>
-              <a:t>1/1/2021</a:t>
+              <a:t>3/2/2021</a:t>
             </a:fld>
             <a:endParaRPr lang="en-US"/>
           </a:p>
@@ -1225,7 +1327,7 @@
           <a:p>
             <a:fld id="{04F1D4A2-813C-F741-B481-C92B3A596030}" type="datetimeFigureOut">
               <a:rPr lang="en-US" smtClean="0"/>
-              <a:t>1/1/2021</a:t>
+              <a:t>3/2/2021</a:t>
             </a:fld>
             <a:endParaRPr lang="en-US"/>
           </a:p>
@@ -1470,7 +1572,7 @@
           <a:p>
             <a:fld id="{04F1D4A2-813C-F741-B481-C92B3A596030}" type="datetimeFigureOut">
               <a:rPr lang="en-US" smtClean="0"/>
-              <a:t>1/1/2021</a:t>
+              <a:t>3/2/2021</a:t>
             </a:fld>
             <a:endParaRPr lang="en-US"/>
           </a:p>
@@ -1699,7 +1801,7 @@
           <a:p>
             <a:fld id="{04F1D4A2-813C-F741-B481-C92B3A596030}" type="datetimeFigureOut">
               <a:rPr lang="en-US" smtClean="0"/>
-              <a:t>1/1/2021</a:t>
+              <a:t>3/2/2021</a:t>
             </a:fld>
             <a:endParaRPr lang="en-US"/>
           </a:p>
@@ -2063,7 +2165,7 @@
           <a:p>
             <a:fld id="{04F1D4A2-813C-F741-B481-C92B3A596030}" type="datetimeFigureOut">
               <a:rPr lang="en-US" smtClean="0"/>
-              <a:t>1/1/2021</a:t>
+              <a:t>3/2/2021</a:t>
             </a:fld>
             <a:endParaRPr lang="en-US"/>
           </a:p>
@@ -2180,7 +2282,7 @@
           <a:p>
             <a:fld id="{04F1D4A2-813C-F741-B481-C92B3A596030}" type="datetimeFigureOut">
               <a:rPr lang="en-US" smtClean="0"/>
-              <a:t>1/1/2021</a:t>
+              <a:t>3/2/2021</a:t>
             </a:fld>
             <a:endParaRPr lang="en-US"/>
           </a:p>
@@ -2275,7 +2377,7 @@
           <a:p>
             <a:fld id="{04F1D4A2-813C-F741-B481-C92B3A596030}" type="datetimeFigureOut">
               <a:rPr lang="en-US" smtClean="0"/>
-              <a:t>1/1/2021</a:t>
+              <a:t>3/2/2021</a:t>
             </a:fld>
             <a:endParaRPr lang="en-US"/>
           </a:p>
@@ -2550,7 +2652,7 @@
           <a:p>
             <a:fld id="{04F1D4A2-813C-F741-B481-C92B3A596030}" type="datetimeFigureOut">
               <a:rPr lang="en-US" smtClean="0"/>
-              <a:t>1/1/2021</a:t>
+              <a:t>3/2/2021</a:t>
             </a:fld>
             <a:endParaRPr lang="en-US"/>
           </a:p>
@@ -2802,7 +2904,7 @@
           <a:p>
             <a:fld id="{04F1D4A2-813C-F741-B481-C92B3A596030}" type="datetimeFigureOut">
               <a:rPr lang="en-US" smtClean="0"/>
-              <a:t>1/1/2021</a:t>
+              <a:t>3/2/2021</a:t>
             </a:fld>
             <a:endParaRPr lang="en-US"/>
           </a:p>
@@ -3013,7 +3115,7 @@
           <a:p>
             <a:fld id="{04F1D4A2-813C-F741-B481-C92B3A596030}" type="datetimeFigureOut">
               <a:rPr lang="en-US" smtClean="0"/>
-              <a:t>1/1/2021</a:t>
+              <a:t>3/2/2021</a:t>
             </a:fld>
             <a:endParaRPr lang="en-US"/>
           </a:p>
@@ -3596,6 +3698,325 @@
 </p:sld>
 </file>
 
+<file path=ppt/slides/slide10.xml><?xml version="1.0" encoding="utf-8"?>
+<p:sld xmlns:a="http://schemas.openxmlformats.org/drawingml/2006/main" xmlns:r="http://schemas.openxmlformats.org/officeDocument/2006/relationships" xmlns:p="http://schemas.openxmlformats.org/presentationml/2006/main">
+  <p:cSld>
+    <p:spTree>
+      <p:nvGrpSpPr>
+        <p:cNvPr id="1" name=""/>
+        <p:cNvGrpSpPr/>
+        <p:nvPr/>
+      </p:nvGrpSpPr>
+      <p:grpSpPr>
+        <a:xfrm>
+          <a:off x="0" y="0"/>
+          <a:ext cx="0" cy="0"/>
+          <a:chOff x="0" y="0"/>
+          <a:chExt cx="0" cy="0"/>
+        </a:xfrm>
+      </p:grpSpPr>
+      <p:sp>
+        <p:nvSpPr>
+          <p:cNvPr id="2" name="Title 1">
+            <a:extLst>
+              <a:ext uri="{FF2B5EF4-FFF2-40B4-BE49-F238E27FC236}">
+                <a16:creationId xmlns:a16="http://schemas.microsoft.com/office/drawing/2014/main" id="{659ECBEA-1E2D-4783-84DA-1EFEAC50F1AA}"/>
+              </a:ext>
+            </a:extLst>
+          </p:cNvPr>
+          <p:cNvSpPr>
+            <a:spLocks noGrp="1"/>
+          </p:cNvSpPr>
+          <p:nvPr>
+            <p:ph type="title"/>
+          </p:nvPr>
+        </p:nvSpPr>
+        <p:spPr/>
+        <p:txBody>
+          <a:bodyPr/>
+          <a:lstStyle/>
+          <a:p>
+            <a:r>
+              <a:rPr lang="en-US" dirty="0"/>
+              <a:t>HTTP Library</a:t>
+            </a:r>
+          </a:p>
+        </p:txBody>
+      </p:sp>
+      <p:sp>
+        <p:nvSpPr>
+          <p:cNvPr id="3" name="Content Placeholder 2">
+            <a:extLst>
+              <a:ext uri="{FF2B5EF4-FFF2-40B4-BE49-F238E27FC236}">
+                <a16:creationId xmlns:a16="http://schemas.microsoft.com/office/drawing/2014/main" id="{4C216C80-D915-451D-8130-A1EA7D94C076}"/>
+              </a:ext>
+            </a:extLst>
+          </p:cNvPr>
+          <p:cNvSpPr>
+            <a:spLocks noGrp="1"/>
+          </p:cNvSpPr>
+          <p:nvPr>
+            <p:ph idx="1"/>
+          </p:nvPr>
+        </p:nvSpPr>
+        <p:spPr>
+          <a:xfrm>
+            <a:off x="136689" y="1825624"/>
+            <a:ext cx="11939047" cy="4867407"/>
+          </a:xfrm>
+        </p:spPr>
+        <p:txBody>
+          <a:bodyPr/>
+          <a:lstStyle/>
+          <a:p>
+            <a:r>
+              <a:rPr lang="en-US" dirty="0"/>
+              <a:t>Going to use </a:t>
+            </a:r>
+            <a:r>
+              <a:rPr lang="en-US" i="1" dirty="0" err="1"/>
+              <a:t>SuperTest</a:t>
+            </a:r>
+            <a:r>
+              <a:rPr lang="en-US" dirty="0"/>
+              <a:t> library to make HTTP calls from the tests</a:t>
+            </a:r>
+          </a:p>
+          <a:p>
+            <a:pPr lvl="1"/>
+            <a:r>
+              <a:rPr lang="en-US" dirty="0"/>
+              <a:t>also used to start server on an ephemeral port</a:t>
+            </a:r>
+          </a:p>
+          <a:p>
+            <a:r>
+              <a:rPr lang="en-US" dirty="0"/>
+              <a:t>Challenge: server and tests are running on the </a:t>
+            </a:r>
+            <a:r>
+              <a:rPr lang="en-US" b="1" dirty="0"/>
+              <a:t>_same_</a:t>
+            </a:r>
+            <a:r>
+              <a:rPr lang="en-US" dirty="0"/>
+              <a:t> thread in </a:t>
+            </a:r>
+            <a:r>
+              <a:rPr lang="en-US" i="1" dirty="0"/>
+              <a:t>NodeJS</a:t>
+            </a:r>
+            <a:r>
+              <a:rPr lang="en-US" dirty="0"/>
+              <a:t>, so need to make proper use of </a:t>
+            </a:r>
+            <a:r>
+              <a:rPr lang="en-US" i="1" dirty="0"/>
+              <a:t>async/await</a:t>
+            </a:r>
+          </a:p>
+        </p:txBody>
+      </p:sp>
+    </p:spTree>
+    <p:extLst>
+      <p:ext uri="{BB962C8B-B14F-4D97-AF65-F5344CB8AC3E}">
+        <p14:creationId xmlns:p14="http://schemas.microsoft.com/office/powerpoint/2010/main" val="3288617363"/>
+      </p:ext>
+    </p:extLst>
+  </p:cSld>
+  <p:clrMapOvr>
+    <a:masterClrMapping/>
+  </p:clrMapOvr>
+</p:sld>
+</file>
+
+<file path=ppt/slides/slide11.xml><?xml version="1.0" encoding="utf-8"?>
+<p:sld xmlns:a="http://schemas.openxmlformats.org/drawingml/2006/main" xmlns:r="http://schemas.openxmlformats.org/officeDocument/2006/relationships" xmlns:p="http://schemas.openxmlformats.org/presentationml/2006/main">
+  <p:cSld>
+    <p:spTree>
+      <p:nvGrpSpPr>
+        <p:cNvPr id="1" name=""/>
+        <p:cNvGrpSpPr/>
+        <p:nvPr/>
+      </p:nvGrpSpPr>
+      <p:grpSpPr>
+        <a:xfrm>
+          <a:off x="0" y="0"/>
+          <a:ext cx="0" cy="0"/>
+          <a:chOff x="0" y="0"/>
+          <a:chExt cx="0" cy="0"/>
+        </a:xfrm>
+      </p:grpSpPr>
+      <p:sp>
+        <p:nvSpPr>
+          <p:cNvPr id="2" name="Title 1">
+            <a:extLst>
+              <a:ext uri="{FF2B5EF4-FFF2-40B4-BE49-F238E27FC236}">
+                <a16:creationId xmlns:a16="http://schemas.microsoft.com/office/drawing/2014/main" id="{70773511-58F7-4E1F-80E5-B795120EBC81}"/>
+              </a:ext>
+            </a:extLst>
+          </p:cNvPr>
+          <p:cNvSpPr>
+            <a:spLocks noGrp="1"/>
+          </p:cNvSpPr>
+          <p:nvPr>
+            <p:ph type="title"/>
+          </p:nvPr>
+        </p:nvSpPr>
+        <p:spPr/>
+        <p:txBody>
+          <a:bodyPr/>
+          <a:lstStyle/>
+          <a:p>
+            <a:r>
+              <a:rPr lang="en-US" dirty="0"/>
+              <a:t>Testing Frontend</a:t>
+            </a:r>
+          </a:p>
+        </p:txBody>
+      </p:sp>
+      <p:sp>
+        <p:nvSpPr>
+          <p:cNvPr id="3" name="Content Placeholder 2">
+            <a:extLst>
+              <a:ext uri="{FF2B5EF4-FFF2-40B4-BE49-F238E27FC236}">
+                <a16:creationId xmlns:a16="http://schemas.microsoft.com/office/drawing/2014/main" id="{AED39879-E6A0-45C2-931D-342C9991A3FD}"/>
+              </a:ext>
+            </a:extLst>
+          </p:cNvPr>
+          <p:cNvSpPr>
+            <a:spLocks noGrp="1"/>
+          </p:cNvSpPr>
+          <p:nvPr>
+            <p:ph idx="1"/>
+          </p:nvPr>
+        </p:nvSpPr>
+        <p:spPr>
+          <a:xfrm>
+            <a:off x="109181" y="1825625"/>
+            <a:ext cx="11955439" cy="4925468"/>
+          </a:xfrm>
+        </p:spPr>
+        <p:txBody>
+          <a:bodyPr/>
+          <a:lstStyle/>
+          <a:p>
+            <a:r>
+              <a:rPr lang="en-US" dirty="0"/>
+              <a:t>When writing tests for </a:t>
+            </a:r>
+            <a:r>
+              <a:rPr lang="en-US" i="1" dirty="0"/>
+              <a:t>React</a:t>
+            </a:r>
+            <a:r>
+              <a:rPr lang="en-US" dirty="0"/>
+              <a:t> components, they will fail when executing “</a:t>
+            </a:r>
+            <a:r>
+              <a:rPr lang="en-US" i="1" dirty="0"/>
+              <a:t>fetch()</a:t>
+            </a:r>
+            <a:r>
+              <a:rPr lang="en-US" dirty="0"/>
+              <a:t>”</a:t>
+            </a:r>
+          </a:p>
+          <a:p>
+            <a:r>
+              <a:rPr lang="en-US" i="1" dirty="0"/>
+              <a:t>fetch()</a:t>
+            </a:r>
+            <a:r>
+              <a:rPr lang="en-US" dirty="0"/>
+              <a:t> is a function in the browser, does not exist in </a:t>
+            </a:r>
+            <a:r>
+              <a:rPr lang="en-US" i="1" dirty="0"/>
+              <a:t>NodeJS</a:t>
+            </a:r>
+          </a:p>
+          <a:p>
+            <a:r>
+              <a:rPr lang="en-US" dirty="0"/>
+              <a:t>Can “</a:t>
+            </a:r>
+            <a:r>
+              <a:rPr lang="en-US" i="1" dirty="0"/>
+              <a:t>stub</a:t>
+            </a:r>
+            <a:r>
+              <a:rPr lang="en-US" dirty="0"/>
+              <a:t>” it away (similarly as we did with </a:t>
+            </a:r>
+            <a:r>
+              <a:rPr lang="en-US" i="1" dirty="0"/>
+              <a:t>alert()</a:t>
+            </a:r>
+            <a:r>
+              <a:rPr lang="en-US" dirty="0"/>
+              <a:t>)</a:t>
+            </a:r>
+          </a:p>
+          <a:p>
+            <a:pPr lvl="1"/>
+            <a:r>
+              <a:rPr lang="en-US" dirty="0" err="1"/>
+              <a:t>ie</a:t>
+            </a:r>
+            <a:r>
+              <a:rPr lang="en-US" dirty="0"/>
+              <a:t>, in the tests, create a custom function “</a:t>
+            </a:r>
+            <a:r>
+              <a:rPr lang="en-US" i="1" dirty="0"/>
+              <a:t>fetch()</a:t>
+            </a:r>
+            <a:r>
+              <a:rPr lang="en-US" dirty="0"/>
+              <a:t>” registered in the global scope</a:t>
+            </a:r>
+          </a:p>
+          <a:p>
+            <a:r>
+              <a:rPr lang="en-US" dirty="0"/>
+              <a:t>Advanced option: start the server, and, in the stubbed </a:t>
+            </a:r>
+            <a:r>
+              <a:rPr lang="en-US" i="1" dirty="0"/>
+              <a:t>fetch()</a:t>
+            </a:r>
+            <a:r>
+              <a:rPr lang="en-US" dirty="0"/>
+              <a:t>, do call </a:t>
+            </a:r>
+            <a:r>
+              <a:rPr lang="en-US" i="1" dirty="0" err="1"/>
+              <a:t>SuperTest</a:t>
+            </a:r>
+            <a:r>
+              <a:rPr lang="en-US" dirty="0"/>
+              <a:t> to connect with the server</a:t>
+            </a:r>
+          </a:p>
+          <a:p>
+            <a:endParaRPr lang="en-US" dirty="0"/>
+          </a:p>
+        </p:txBody>
+      </p:sp>
+    </p:spTree>
+    <p:extLst>
+      <p:ext uri="{BB962C8B-B14F-4D97-AF65-F5344CB8AC3E}">
+        <p14:creationId xmlns:p14="http://schemas.microsoft.com/office/powerpoint/2010/main" val="3003859767"/>
+      </p:ext>
+    </p:extLst>
+  </p:cSld>
+  <p:clrMapOvr>
+    <a:masterClrMapping/>
+  </p:clrMapOvr>
+</p:sld>
+</file>
+
 <file path=ppt/slides/slide2.xml><?xml version="1.0" encoding="utf-8"?>
 <p:sld xmlns:a="http://schemas.openxmlformats.org/drawingml/2006/main" xmlns:r="http://schemas.openxmlformats.org/officeDocument/2006/relationships" xmlns:p="http://schemas.openxmlformats.org/presentationml/2006/main">
   <p:cSld>
@@ -3657,17 +4078,13 @@
           <a:p>
             <a:r>
               <a:rPr lang="en-US" dirty="0"/>
-              <a:t>Introduction on how to build a REST web service </a:t>
-            </a:r>
-            <a:r>
-              <a:rPr lang="en-US"/>
-              <a:t>using NodeJS</a:t>
-            </a:r>
-          </a:p>
-          <a:p>
-            <a:r>
-              <a:rPr lang="en-US" dirty="0"/>
-              <a:t>TODO</a:t>
+              <a:t>Learn how to build a REST web service using NodeJS</a:t>
+            </a:r>
+          </a:p>
+          <a:p>
+            <a:r>
+              <a:rPr lang="en-US" dirty="0"/>
+              <a:t>Learn how to write tests for a REST web service</a:t>
             </a:r>
           </a:p>
         </p:txBody>
@@ -3676,6 +4093,1491 @@
     <p:extLst>
       <p:ext uri="{BB962C8B-B14F-4D97-AF65-F5344CB8AC3E}">
         <p14:creationId xmlns:p14="http://schemas.microsoft.com/office/powerpoint/2010/main" val="1370664921"/>
+      </p:ext>
+    </p:extLst>
+  </p:cSld>
+  <p:clrMapOvr>
+    <a:masterClrMapping/>
+  </p:clrMapOvr>
+</p:sld>
+</file>
+
+<file path=ppt/slides/slide3.xml><?xml version="1.0" encoding="utf-8"?>
+<p:sld xmlns:a="http://schemas.openxmlformats.org/drawingml/2006/main" xmlns:r="http://schemas.openxmlformats.org/officeDocument/2006/relationships" xmlns:p="http://schemas.openxmlformats.org/presentationml/2006/main">
+  <p:cSld>
+    <p:spTree>
+      <p:nvGrpSpPr>
+        <p:cNvPr id="1" name=""/>
+        <p:cNvGrpSpPr/>
+        <p:nvPr/>
+      </p:nvGrpSpPr>
+      <p:grpSpPr>
+        <a:xfrm>
+          <a:off x="0" y="0"/>
+          <a:ext cx="0" cy="0"/>
+          <a:chOff x="0" y="0"/>
+          <a:chExt cx="0" cy="0"/>
+        </a:xfrm>
+      </p:grpSpPr>
+      <p:sp>
+        <p:nvSpPr>
+          <p:cNvPr id="2" name="Title 1">
+            <a:extLst>
+              <a:ext uri="{FF2B5EF4-FFF2-40B4-BE49-F238E27FC236}">
+                <a16:creationId xmlns:a16="http://schemas.microsoft.com/office/drawing/2014/main" id="{ECBAA7DC-F577-432D-A12B-D355473F13B5}"/>
+              </a:ext>
+            </a:extLst>
+          </p:cNvPr>
+          <p:cNvSpPr>
+            <a:spLocks noGrp="1"/>
+          </p:cNvSpPr>
+          <p:nvPr>
+            <p:ph type="title"/>
+          </p:nvPr>
+        </p:nvSpPr>
+        <p:spPr/>
+        <p:txBody>
+          <a:bodyPr/>
+          <a:lstStyle/>
+          <a:p>
+            <a:r>
+              <a:rPr lang="en-US" dirty="0"/>
+              <a:t>Express</a:t>
+            </a:r>
+          </a:p>
+        </p:txBody>
+      </p:sp>
+      <p:sp>
+        <p:nvSpPr>
+          <p:cNvPr id="3" name="Content Placeholder 2">
+            <a:extLst>
+              <a:ext uri="{FF2B5EF4-FFF2-40B4-BE49-F238E27FC236}">
+                <a16:creationId xmlns:a16="http://schemas.microsoft.com/office/drawing/2014/main" id="{FC3500A6-6786-4F74-9504-081055F74154}"/>
+              </a:ext>
+            </a:extLst>
+          </p:cNvPr>
+          <p:cNvSpPr>
+            <a:spLocks noGrp="1"/>
+          </p:cNvSpPr>
+          <p:nvPr>
+            <p:ph idx="1"/>
+          </p:nvPr>
+        </p:nvSpPr>
+        <p:spPr>
+          <a:xfrm>
+            <a:off x="197963" y="1825624"/>
+            <a:ext cx="11764651" cy="4890973"/>
+          </a:xfrm>
+        </p:spPr>
+        <p:txBody>
+          <a:bodyPr/>
+          <a:lstStyle/>
+          <a:p>
+            <a:r>
+              <a:rPr lang="en-US" dirty="0"/>
+              <a:t>In NodeJS, need to run an HTTP server</a:t>
+            </a:r>
+          </a:p>
+          <a:p>
+            <a:r>
+              <a:rPr lang="en-US" b="1" dirty="0"/>
+              <a:t>Express</a:t>
+            </a:r>
+            <a:r>
+              <a:rPr lang="en-US" dirty="0"/>
+              <a:t> is the most used/famous</a:t>
+            </a:r>
+          </a:p>
+          <a:p>
+            <a:pPr lvl="1"/>
+            <a:r>
+              <a:rPr lang="en-US" dirty="0"/>
+              <a:t>but not necessarily the best</a:t>
+            </a:r>
+          </a:p>
+          <a:p>
+            <a:r>
+              <a:rPr lang="en-US" dirty="0"/>
+              <a:t>Going to write “</a:t>
+            </a:r>
+            <a:r>
+              <a:rPr lang="en-US" i="1" dirty="0"/>
+              <a:t>HTTP Handlers</a:t>
+            </a:r>
+            <a:r>
+              <a:rPr lang="en-US" dirty="0"/>
+              <a:t>”</a:t>
+            </a:r>
+          </a:p>
+          <a:p>
+            <a:pPr lvl="1"/>
+            <a:r>
+              <a:rPr lang="en-US" dirty="0"/>
+              <a:t>functions that are executed each time there is an incoming HTTP request for a given URI</a:t>
+            </a:r>
+          </a:p>
+          <a:p>
+            <a:pPr lvl="1"/>
+            <a:endParaRPr lang="en-US" dirty="0"/>
+          </a:p>
+          <a:p>
+            <a:endParaRPr lang="en-US" dirty="0"/>
+          </a:p>
+        </p:txBody>
+      </p:sp>
+    </p:spTree>
+    <p:extLst>
+      <p:ext uri="{BB962C8B-B14F-4D97-AF65-F5344CB8AC3E}">
+        <p14:creationId xmlns:p14="http://schemas.microsoft.com/office/powerpoint/2010/main" val="2094273473"/>
+      </p:ext>
+    </p:extLst>
+  </p:cSld>
+  <p:clrMapOvr>
+    <a:masterClrMapping/>
+  </p:clrMapOvr>
+</p:sld>
+</file>
+
+<file path=ppt/slides/slide4.xml><?xml version="1.0" encoding="utf-8"?>
+<p:sld xmlns:a="http://schemas.openxmlformats.org/drawingml/2006/main" xmlns:r="http://schemas.openxmlformats.org/officeDocument/2006/relationships" xmlns:p="http://schemas.openxmlformats.org/presentationml/2006/main">
+  <p:cSld>
+    <p:spTree>
+      <p:nvGrpSpPr>
+        <p:cNvPr id="1" name=""/>
+        <p:cNvGrpSpPr/>
+        <p:nvPr/>
+      </p:nvGrpSpPr>
+      <p:grpSpPr>
+        <a:xfrm>
+          <a:off x="0" y="0"/>
+          <a:ext cx="0" cy="0"/>
+          <a:chOff x="0" y="0"/>
+          <a:chExt cx="0" cy="0"/>
+        </a:xfrm>
+      </p:grpSpPr>
+      <p:sp>
+        <p:nvSpPr>
+          <p:cNvPr id="2" name="Title 1">
+            <a:extLst>
+              <a:ext uri="{FF2B5EF4-FFF2-40B4-BE49-F238E27FC236}">
+                <a16:creationId xmlns:a16="http://schemas.microsoft.com/office/drawing/2014/main" id="{23342085-517A-40C0-BE38-3A8548E042D0}"/>
+              </a:ext>
+            </a:extLst>
+          </p:cNvPr>
+          <p:cNvSpPr>
+            <a:spLocks noGrp="1"/>
+          </p:cNvSpPr>
+          <p:nvPr>
+            <p:ph type="title"/>
+          </p:nvPr>
+        </p:nvSpPr>
+        <p:spPr/>
+        <p:txBody>
+          <a:bodyPr/>
+          <a:lstStyle/>
+          <a:p>
+            <a:r>
+              <a:rPr lang="en-US" dirty="0"/>
+              <a:t>Request/Response Objects</a:t>
+            </a:r>
+          </a:p>
+        </p:txBody>
+      </p:sp>
+      <p:sp>
+        <p:nvSpPr>
+          <p:cNvPr id="3" name="Content Placeholder 2">
+            <a:extLst>
+              <a:ext uri="{FF2B5EF4-FFF2-40B4-BE49-F238E27FC236}">
+                <a16:creationId xmlns:a16="http://schemas.microsoft.com/office/drawing/2014/main" id="{38BF3B31-6CA5-4F8E-87B9-852E52D0F1F4}"/>
+              </a:ext>
+            </a:extLst>
+          </p:cNvPr>
+          <p:cNvSpPr>
+            <a:spLocks noGrp="1"/>
+          </p:cNvSpPr>
+          <p:nvPr>
+            <p:ph idx="1"/>
+          </p:nvPr>
+        </p:nvSpPr>
+        <p:spPr>
+          <a:xfrm>
+            <a:off x="197963" y="1825624"/>
+            <a:ext cx="11854206" cy="4923968"/>
+          </a:xfrm>
+        </p:spPr>
+        <p:txBody>
+          <a:bodyPr/>
+          <a:lstStyle/>
+          <a:p>
+            <a:r>
+              <a:rPr lang="en-US" dirty="0"/>
+              <a:t>We are not going to manipulate the HTTP messages directly</a:t>
+            </a:r>
+          </a:p>
+          <a:p>
+            <a:r>
+              <a:rPr lang="en-US" dirty="0"/>
+              <a:t>Handler will take as input a JS object representing the </a:t>
+            </a:r>
+            <a:r>
+              <a:rPr lang="en-US" i="1" dirty="0"/>
+              <a:t>request</a:t>
+            </a:r>
+          </a:p>
+          <a:p>
+            <a:pPr lvl="1"/>
+            <a:r>
+              <a:rPr lang="en-US" dirty="0"/>
+              <a:t>it is </a:t>
+            </a:r>
+            <a:r>
+              <a:rPr lang="en-US" i="1" dirty="0"/>
+              <a:t>Express</a:t>
+            </a:r>
+            <a:r>
+              <a:rPr lang="en-US" dirty="0"/>
+              <a:t> that will create such object based on incoming HTTP</a:t>
+            </a:r>
+          </a:p>
+          <a:p>
+            <a:r>
+              <a:rPr lang="en-US" dirty="0"/>
+              <a:t>Take as input as well a </a:t>
+            </a:r>
+            <a:r>
+              <a:rPr lang="en-US" i="1" dirty="0"/>
+              <a:t>response</a:t>
+            </a:r>
+            <a:r>
+              <a:rPr lang="en-US" dirty="0"/>
+              <a:t> object</a:t>
+            </a:r>
+          </a:p>
+          <a:p>
+            <a:pPr lvl="1"/>
+            <a:r>
+              <a:rPr lang="en-US" dirty="0"/>
+              <a:t>we can modify it in the handler function </a:t>
+            </a:r>
+          </a:p>
+          <a:p>
+            <a:pPr lvl="1"/>
+            <a:r>
+              <a:rPr lang="en-US" dirty="0"/>
+              <a:t>once handler function is completed, </a:t>
+            </a:r>
+            <a:r>
+              <a:rPr lang="en-US" i="1" dirty="0"/>
+              <a:t>Express</a:t>
+            </a:r>
+            <a:r>
+              <a:rPr lang="en-US" dirty="0"/>
+              <a:t> will create a HTTP response based on such response object</a:t>
+            </a:r>
+          </a:p>
+        </p:txBody>
+      </p:sp>
+    </p:spTree>
+    <p:extLst>
+      <p:ext uri="{BB962C8B-B14F-4D97-AF65-F5344CB8AC3E}">
+        <p14:creationId xmlns:p14="http://schemas.microsoft.com/office/powerpoint/2010/main" val="554633860"/>
+      </p:ext>
+    </p:extLst>
+  </p:cSld>
+  <p:clrMapOvr>
+    <a:masterClrMapping/>
+  </p:clrMapOvr>
+</p:sld>
+</file>
+
+<file path=ppt/slides/slide5.xml><?xml version="1.0" encoding="utf-8"?>
+<p:sld xmlns:a="http://schemas.openxmlformats.org/drawingml/2006/main" xmlns:r="http://schemas.openxmlformats.org/officeDocument/2006/relationships" xmlns:p="http://schemas.openxmlformats.org/presentationml/2006/main">
+  <p:cSld>
+    <p:spTree>
+      <p:nvGrpSpPr>
+        <p:cNvPr id="1" name=""/>
+        <p:cNvGrpSpPr/>
+        <p:nvPr/>
+      </p:nvGrpSpPr>
+      <p:grpSpPr>
+        <a:xfrm>
+          <a:off x="0" y="0"/>
+          <a:ext cx="0" cy="0"/>
+          <a:chOff x="0" y="0"/>
+          <a:chExt cx="0" cy="0"/>
+        </a:xfrm>
+      </p:grpSpPr>
+      <p:sp>
+        <p:nvSpPr>
+          <p:cNvPr id="2" name="Title 1">
+            <a:extLst>
+              <a:ext uri="{FF2B5EF4-FFF2-40B4-BE49-F238E27FC236}">
+                <a16:creationId xmlns:a16="http://schemas.microsoft.com/office/drawing/2014/main" id="{D0264C14-8153-44FB-8036-76ADA46491F4}"/>
+              </a:ext>
+            </a:extLst>
+          </p:cNvPr>
+          <p:cNvSpPr>
+            <a:spLocks noGrp="1"/>
+          </p:cNvSpPr>
+          <p:nvPr>
+            <p:ph type="title"/>
+          </p:nvPr>
+        </p:nvSpPr>
+        <p:spPr/>
+        <p:txBody>
+          <a:bodyPr/>
+          <a:lstStyle/>
+          <a:p>
+            <a:r>
+              <a:rPr lang="en-US" dirty="0"/>
+              <a:t>Static Assets</a:t>
+            </a:r>
+          </a:p>
+        </p:txBody>
+      </p:sp>
+      <p:sp>
+        <p:nvSpPr>
+          <p:cNvPr id="3" name="Content Placeholder 2">
+            <a:extLst>
+              <a:ext uri="{FF2B5EF4-FFF2-40B4-BE49-F238E27FC236}">
+                <a16:creationId xmlns:a16="http://schemas.microsoft.com/office/drawing/2014/main" id="{BE1E347A-7AB3-416A-8450-9F1A78A3B534}"/>
+              </a:ext>
+            </a:extLst>
+          </p:cNvPr>
+          <p:cNvSpPr>
+            <a:spLocks noGrp="1"/>
+          </p:cNvSpPr>
+          <p:nvPr>
+            <p:ph idx="1"/>
+          </p:nvPr>
+        </p:nvSpPr>
+        <p:spPr>
+          <a:xfrm>
+            <a:off x="188535" y="1825624"/>
+            <a:ext cx="11882487" cy="4905114"/>
+          </a:xfrm>
+        </p:spPr>
+        <p:txBody>
+          <a:bodyPr/>
+          <a:lstStyle/>
+          <a:p>
+            <a:r>
+              <a:rPr lang="en-US" dirty="0"/>
+              <a:t>As any HTTP server, can instruct </a:t>
+            </a:r>
+            <a:r>
+              <a:rPr lang="en-US" i="1" dirty="0"/>
+              <a:t>Express</a:t>
+            </a:r>
+            <a:r>
+              <a:rPr lang="en-US" dirty="0"/>
+              <a:t> to serve static assets</a:t>
+            </a:r>
+          </a:p>
+          <a:p>
+            <a:pPr lvl="1"/>
+            <a:r>
+              <a:rPr lang="en-US" dirty="0" err="1"/>
+              <a:t>eg</a:t>
+            </a:r>
+            <a:r>
+              <a:rPr lang="en-US" dirty="0"/>
+              <a:t>, all files under “</a:t>
+            </a:r>
+            <a:r>
+              <a:rPr lang="en-US" i="1" dirty="0"/>
+              <a:t>public</a:t>
+            </a:r>
+            <a:r>
+              <a:rPr lang="en-US" dirty="0"/>
+              <a:t>” folder</a:t>
+            </a:r>
+          </a:p>
+          <a:p>
+            <a:pPr lvl="1"/>
+            <a:r>
+              <a:rPr lang="en-US" dirty="0"/>
+              <a:t>going to be a HTTP handler, like the others</a:t>
+            </a:r>
+          </a:p>
+          <a:p>
+            <a:r>
+              <a:rPr lang="en-US" dirty="0"/>
+              <a:t>Can still use </a:t>
+            </a:r>
+            <a:r>
+              <a:rPr lang="en-US" i="1" dirty="0" err="1"/>
+              <a:t>WebPack</a:t>
+            </a:r>
+            <a:r>
+              <a:rPr lang="en-US" dirty="0"/>
+              <a:t> to create</a:t>
+            </a:r>
+            <a:r>
+              <a:rPr lang="en-US" i="1" dirty="0"/>
+              <a:t> bundle.js</a:t>
+            </a:r>
+            <a:r>
+              <a:rPr lang="en-US" dirty="0"/>
+              <a:t>, and put it under “</a:t>
+            </a:r>
+            <a:r>
+              <a:rPr lang="en-US" i="1" dirty="0"/>
+              <a:t>public</a:t>
+            </a:r>
+            <a:r>
+              <a:rPr lang="en-US" dirty="0"/>
+              <a:t>”</a:t>
+            </a:r>
+          </a:p>
+          <a:p>
+            <a:pPr marL="0" indent="0">
+              <a:buNone/>
+            </a:pPr>
+            <a:endParaRPr lang="en-US" dirty="0"/>
+          </a:p>
+        </p:txBody>
+      </p:sp>
+    </p:spTree>
+    <p:extLst>
+      <p:ext uri="{BB962C8B-B14F-4D97-AF65-F5344CB8AC3E}">
+        <p14:creationId xmlns:p14="http://schemas.microsoft.com/office/powerpoint/2010/main" val="779616821"/>
+      </p:ext>
+    </p:extLst>
+  </p:cSld>
+  <p:clrMapOvr>
+    <a:masterClrMapping/>
+  </p:clrMapOvr>
+</p:sld>
+</file>
+
+<file path=ppt/slides/slide6.xml><?xml version="1.0" encoding="utf-8"?>
+<p:sld xmlns:a="http://schemas.openxmlformats.org/drawingml/2006/main" xmlns:r="http://schemas.openxmlformats.org/officeDocument/2006/relationships" xmlns:p="http://schemas.openxmlformats.org/presentationml/2006/main">
+  <p:cSld>
+    <p:spTree>
+      <p:nvGrpSpPr>
+        <p:cNvPr id="1" name=""/>
+        <p:cNvGrpSpPr/>
+        <p:nvPr/>
+      </p:nvGrpSpPr>
+      <p:grpSpPr>
+        <a:xfrm>
+          <a:off x="0" y="0"/>
+          <a:ext cx="0" cy="0"/>
+          <a:chOff x="0" y="0"/>
+          <a:chExt cx="0" cy="0"/>
+        </a:xfrm>
+      </p:grpSpPr>
+      <p:sp>
+        <p:nvSpPr>
+          <p:cNvPr id="2" name="Title 1">
+            <a:extLst>
+              <a:ext uri="{FF2B5EF4-FFF2-40B4-BE49-F238E27FC236}">
+                <a16:creationId xmlns:a16="http://schemas.microsoft.com/office/drawing/2014/main" id="{C8FEAA04-FC53-4D00-99A9-D3F6F3DE7C51}"/>
+              </a:ext>
+            </a:extLst>
+          </p:cNvPr>
+          <p:cNvSpPr>
+            <a:spLocks noGrp="1"/>
+          </p:cNvSpPr>
+          <p:nvPr>
+            <p:ph type="title"/>
+          </p:nvPr>
+        </p:nvSpPr>
+        <p:spPr/>
+        <p:txBody>
+          <a:bodyPr/>
+          <a:lstStyle/>
+          <a:p>
+            <a:r>
+              <a:rPr lang="en-US" dirty="0"/>
+              <a:t>Application Entry Point</a:t>
+            </a:r>
+          </a:p>
+        </p:txBody>
+      </p:sp>
+      <p:sp>
+        <p:nvSpPr>
+          <p:cNvPr id="3" name="Content Placeholder 2">
+            <a:extLst>
+              <a:ext uri="{FF2B5EF4-FFF2-40B4-BE49-F238E27FC236}">
+                <a16:creationId xmlns:a16="http://schemas.microsoft.com/office/drawing/2014/main" id="{EBF92B7C-5B50-46D6-B09A-47905F920445}"/>
+              </a:ext>
+            </a:extLst>
+          </p:cNvPr>
+          <p:cNvSpPr>
+            <a:spLocks noGrp="1"/>
+          </p:cNvSpPr>
+          <p:nvPr>
+            <p:ph idx="1"/>
+          </p:nvPr>
+        </p:nvSpPr>
+        <p:spPr>
+          <a:xfrm>
+            <a:off x="235669" y="1825624"/>
+            <a:ext cx="11863633" cy="4890973"/>
+          </a:xfrm>
+        </p:spPr>
+        <p:txBody>
+          <a:bodyPr/>
+          <a:lstStyle/>
+          <a:p>
+            <a:r>
+              <a:rPr lang="en-US" dirty="0"/>
+              <a:t>Need one entry point JS file that starts </a:t>
+            </a:r>
+            <a:r>
+              <a:rPr lang="en-US" i="1" dirty="0"/>
+              <a:t>Express</a:t>
+            </a:r>
+          </a:p>
+          <a:p>
+            <a:r>
+              <a:rPr lang="en-US" dirty="0"/>
+              <a:t>We will use “</a:t>
+            </a:r>
+            <a:r>
+              <a:rPr lang="en-US" i="1" dirty="0"/>
+              <a:t>node</a:t>
+            </a:r>
+            <a:r>
+              <a:rPr lang="en-US" dirty="0"/>
+              <a:t>” command to run it</a:t>
+            </a:r>
+          </a:p>
+          <a:p>
+            <a:pPr lvl="1"/>
+            <a:r>
+              <a:rPr lang="en-US" dirty="0"/>
+              <a:t>recall that JS is not compiled</a:t>
+            </a:r>
+          </a:p>
+          <a:p>
+            <a:r>
+              <a:rPr lang="en-US" dirty="0" err="1"/>
+              <a:t>Eg</a:t>
+            </a:r>
+            <a:r>
+              <a:rPr lang="en-US" dirty="0"/>
+              <a:t> in </a:t>
+            </a:r>
+            <a:r>
+              <a:rPr lang="en-US" i="1" dirty="0" err="1"/>
+              <a:t>package.json</a:t>
+            </a:r>
+            <a:r>
+              <a:rPr lang="en-US" dirty="0"/>
+              <a:t>, </a:t>
+            </a:r>
+            <a:r>
+              <a:rPr lang="en-US" b="1" dirty="0"/>
+              <a:t>"start": "node </a:t>
+            </a:r>
+            <a:r>
+              <a:rPr lang="en-US" b="1" dirty="0" err="1"/>
+              <a:t>src</a:t>
+            </a:r>
+            <a:r>
+              <a:rPr lang="en-US" b="1" dirty="0"/>
+              <a:t>/server/server.js"</a:t>
+            </a:r>
+          </a:p>
+          <a:p>
+            <a:r>
+              <a:rPr lang="en-US" dirty="0"/>
+              <a:t>But need to remember to build the </a:t>
+            </a:r>
+            <a:r>
+              <a:rPr lang="en-US" i="1" dirty="0"/>
+              <a:t>bundle.js</a:t>
+            </a:r>
+            <a:r>
+              <a:rPr lang="en-US" dirty="0"/>
+              <a:t> first, </a:t>
+            </a:r>
+            <a:r>
+              <a:rPr lang="en-US" dirty="0" err="1"/>
+              <a:t>ie</a:t>
+            </a:r>
+            <a:r>
+              <a:rPr lang="en-US" dirty="0"/>
+              <a:t>, </a:t>
+            </a:r>
+            <a:r>
+              <a:rPr lang="en-US" b="1" dirty="0"/>
+              <a:t>"build": "webpack --mode production"</a:t>
+            </a:r>
+          </a:p>
+        </p:txBody>
+      </p:sp>
+    </p:spTree>
+    <p:extLst>
+      <p:ext uri="{BB962C8B-B14F-4D97-AF65-F5344CB8AC3E}">
+        <p14:creationId xmlns:p14="http://schemas.microsoft.com/office/powerpoint/2010/main" val="321564929"/>
+      </p:ext>
+    </p:extLst>
+  </p:cSld>
+  <p:clrMapOvr>
+    <a:masterClrMapping/>
+  </p:clrMapOvr>
+</p:sld>
+</file>
+
+<file path=ppt/slides/slide7.xml><?xml version="1.0" encoding="utf-8"?>
+<p:sld xmlns:a="http://schemas.openxmlformats.org/drawingml/2006/main" xmlns:r="http://schemas.openxmlformats.org/officeDocument/2006/relationships" xmlns:p="http://schemas.openxmlformats.org/presentationml/2006/main">
+  <p:cSld>
+    <p:spTree>
+      <p:nvGrpSpPr>
+        <p:cNvPr id="1" name=""/>
+        <p:cNvGrpSpPr/>
+        <p:nvPr/>
+      </p:nvGrpSpPr>
+      <p:grpSpPr>
+        <a:xfrm>
+          <a:off x="0" y="0"/>
+          <a:ext cx="0" cy="0"/>
+          <a:chOff x="0" y="0"/>
+          <a:chExt cx="0" cy="0"/>
+        </a:xfrm>
+      </p:grpSpPr>
+      <p:sp>
+        <p:nvSpPr>
+          <p:cNvPr id="2" name="Title 1">
+            <a:extLst>
+              <a:ext uri="{FF2B5EF4-FFF2-40B4-BE49-F238E27FC236}">
+                <a16:creationId xmlns:a16="http://schemas.microsoft.com/office/drawing/2014/main" id="{766C35A9-9D98-43FB-8AF4-2B460FC60A49}"/>
+              </a:ext>
+            </a:extLst>
+          </p:cNvPr>
+          <p:cNvSpPr>
+            <a:spLocks noGrp="1"/>
+          </p:cNvSpPr>
+          <p:nvPr>
+            <p:ph type="title"/>
+          </p:nvPr>
+        </p:nvSpPr>
+        <p:spPr/>
+        <p:txBody>
+          <a:bodyPr/>
+          <a:lstStyle/>
+          <a:p>
+            <a:r>
+              <a:rPr lang="en-US" dirty="0"/>
+              <a:t>Development Mode</a:t>
+            </a:r>
+          </a:p>
+        </p:txBody>
+      </p:sp>
+      <p:sp>
+        <p:nvSpPr>
+          <p:cNvPr id="3" name="Content Placeholder 2">
+            <a:extLst>
+              <a:ext uri="{FF2B5EF4-FFF2-40B4-BE49-F238E27FC236}">
+                <a16:creationId xmlns:a16="http://schemas.microsoft.com/office/drawing/2014/main" id="{773067FC-F4C1-4038-AAE6-EEB42E59EBA2}"/>
+              </a:ext>
+            </a:extLst>
+          </p:cNvPr>
+          <p:cNvSpPr>
+            <a:spLocks noGrp="1"/>
+          </p:cNvSpPr>
+          <p:nvPr>
+            <p:ph idx="1"/>
+          </p:nvPr>
+        </p:nvSpPr>
+        <p:spPr>
+          <a:xfrm>
+            <a:off x="296944" y="1825625"/>
+            <a:ext cx="11731658" cy="4881546"/>
+          </a:xfrm>
+        </p:spPr>
+        <p:txBody>
+          <a:bodyPr/>
+          <a:lstStyle/>
+          <a:p>
+            <a:r>
+              <a:rPr lang="en-US" dirty="0"/>
+              <a:t>During development, it is annoying to rebuild </a:t>
+            </a:r>
+            <a:r>
+              <a:rPr lang="en-US" i="1" dirty="0"/>
+              <a:t>bundle.js </a:t>
+            </a:r>
+            <a:r>
+              <a:rPr lang="en-US" dirty="0"/>
+              <a:t>and restart server at each code change</a:t>
+            </a:r>
+          </a:p>
+          <a:p>
+            <a:r>
+              <a:rPr lang="en-US" i="1" dirty="0"/>
+              <a:t>Hot Reload</a:t>
+            </a:r>
+            <a:r>
+              <a:rPr lang="en-US" dirty="0"/>
+              <a:t>: automatically detect if any change in the source code, and update server automatically</a:t>
+            </a:r>
+          </a:p>
+        </p:txBody>
+      </p:sp>
+    </p:spTree>
+    <p:extLst>
+      <p:ext uri="{BB962C8B-B14F-4D97-AF65-F5344CB8AC3E}">
+        <p14:creationId xmlns:p14="http://schemas.microsoft.com/office/powerpoint/2010/main" val="301375581"/>
+      </p:ext>
+    </p:extLst>
+  </p:cSld>
+  <p:clrMapOvr>
+    <a:masterClrMapping/>
+  </p:clrMapOvr>
+</p:sld>
+</file>
+
+<file path=ppt/slides/slide8.xml><?xml version="1.0" encoding="utf-8"?>
+<p:sld xmlns:a="http://schemas.openxmlformats.org/drawingml/2006/main" xmlns:r="http://schemas.openxmlformats.org/officeDocument/2006/relationships" xmlns:p="http://schemas.openxmlformats.org/presentationml/2006/main">
+  <p:cSld>
+    <p:spTree>
+      <p:nvGrpSpPr>
+        <p:cNvPr id="1" name=""/>
+        <p:cNvGrpSpPr/>
+        <p:nvPr/>
+      </p:nvGrpSpPr>
+      <p:grpSpPr>
+        <a:xfrm>
+          <a:off x="0" y="0"/>
+          <a:ext cx="0" cy="0"/>
+          <a:chOff x="0" y="0"/>
+          <a:chExt cx="0" cy="0"/>
+        </a:xfrm>
+      </p:grpSpPr>
+      <p:sp>
+        <p:nvSpPr>
+          <p:cNvPr id="3" name="Content Placeholder 2">
+            <a:extLst>
+              <a:ext uri="{FF2B5EF4-FFF2-40B4-BE49-F238E27FC236}">
+                <a16:creationId xmlns:a16="http://schemas.microsoft.com/office/drawing/2014/main" id="{3B2DA83B-4B0D-464B-AA33-6772E57A8BAF}"/>
+              </a:ext>
+            </a:extLst>
+          </p:cNvPr>
+          <p:cNvSpPr>
+            <a:spLocks noGrp="1"/>
+          </p:cNvSpPr>
+          <p:nvPr>
+            <p:ph idx="1"/>
+          </p:nvPr>
+        </p:nvSpPr>
+        <p:spPr>
+          <a:xfrm>
+            <a:off x="155541" y="1748673"/>
+            <a:ext cx="11924907" cy="4428290"/>
+          </a:xfrm>
+        </p:spPr>
+        <p:txBody>
+          <a:bodyPr/>
+          <a:lstStyle/>
+          <a:p>
+            <a:r>
+              <a:rPr lang="en-US" dirty="0"/>
+              <a:t>In “</a:t>
+            </a:r>
+            <a:r>
+              <a:rPr lang="en-US" i="1" dirty="0"/>
+              <a:t>dev</a:t>
+            </a:r>
+            <a:r>
+              <a:rPr lang="en-US" dirty="0"/>
+              <a:t>”, run 2 processes in parallel, using the “</a:t>
+            </a:r>
+            <a:r>
+              <a:rPr lang="en-US" i="1" dirty="0"/>
+              <a:t>concurrently</a:t>
+            </a:r>
+            <a:r>
+              <a:rPr lang="en-US" dirty="0"/>
+              <a:t>” command</a:t>
+            </a:r>
+          </a:p>
+          <a:p>
+            <a:r>
+              <a:rPr lang="en-US" dirty="0"/>
+              <a:t>1) Run </a:t>
+            </a:r>
+            <a:r>
+              <a:rPr lang="en-US" i="1" dirty="0" err="1"/>
+              <a:t>WebPack</a:t>
+            </a:r>
+            <a:r>
+              <a:rPr lang="en-US" dirty="0"/>
+              <a:t> in “</a:t>
+            </a:r>
+            <a:r>
+              <a:rPr lang="en-US" i="1" dirty="0"/>
+              <a:t>watch</a:t>
+            </a:r>
+            <a:r>
+              <a:rPr lang="en-US" dirty="0"/>
+              <a:t>” mode, which rebuilds the </a:t>
+            </a:r>
+            <a:r>
+              <a:rPr lang="en-US" i="1" dirty="0"/>
+              <a:t>bundle.js </a:t>
+            </a:r>
+            <a:r>
+              <a:rPr lang="en-US" dirty="0"/>
+              <a:t>at each source code change</a:t>
+            </a:r>
+          </a:p>
+          <a:p>
+            <a:r>
+              <a:rPr lang="en-US" dirty="0"/>
+              <a:t>2) Run “</a:t>
+            </a:r>
+            <a:r>
+              <a:rPr lang="en-US" i="1" dirty="0" err="1"/>
+              <a:t>nodemon</a:t>
+            </a:r>
+            <a:r>
+              <a:rPr lang="en-US" dirty="0"/>
+              <a:t>”, which is equivalent to “</a:t>
+            </a:r>
+            <a:r>
+              <a:rPr lang="en-US" i="1" dirty="0"/>
+              <a:t>node</a:t>
+            </a:r>
+            <a:r>
+              <a:rPr lang="en-US" dirty="0"/>
+              <a:t>”, but can automatically restart if it detects any change in the files/folders specified with “</a:t>
+            </a:r>
+            <a:r>
+              <a:rPr lang="en-US" i="1" dirty="0"/>
+              <a:t>--watch</a:t>
+            </a:r>
+            <a:r>
+              <a:rPr lang="en-US" dirty="0"/>
+              <a:t>”</a:t>
+            </a:r>
+          </a:p>
+        </p:txBody>
+      </p:sp>
+      <p:sp>
+        <p:nvSpPr>
+          <p:cNvPr id="4" name="Rectangle 1">
+            <a:extLst>
+              <a:ext uri="{FF2B5EF4-FFF2-40B4-BE49-F238E27FC236}">
+                <a16:creationId xmlns:a16="http://schemas.microsoft.com/office/drawing/2014/main" id="{55886A92-4AB1-4171-A5BB-BB9A7AA9DE53}"/>
+              </a:ext>
+            </a:extLst>
+          </p:cNvPr>
+          <p:cNvSpPr>
+            <a:spLocks noChangeArrowheads="1"/>
+          </p:cNvSpPr>
+          <p:nvPr/>
+        </p:nvSpPr>
+        <p:spPr bwMode="auto">
+          <a:xfrm>
+            <a:off x="117835" y="139838"/>
+            <a:ext cx="11613823" cy="1200329"/>
+          </a:xfrm>
+          <a:prstGeom prst="rect">
+            <a:avLst/>
+          </a:prstGeom>
+          <a:solidFill>
+            <a:srgbClr val="2B2B2B"/>
+          </a:solidFill>
+          <a:ln>
+            <a:noFill/>
+          </a:ln>
+          <a:effectLst/>
+          <a:extLst>
+            <a:ext uri="{91240B29-F687-4F45-9708-019B960494DF}">
+              <a14:hiddenLine xmlns:a14="http://schemas.microsoft.com/office/drawing/2010/main" w="9525">
+                <a:solidFill>
+                  <a:schemeClr val="tx1"/>
+                </a:solidFill>
+                <a:miter lim="800000"/>
+                <a:headEnd/>
+                <a:tailEnd/>
+              </a14:hiddenLine>
+            </a:ext>
+            <a:ext uri="{AF507438-7753-43E0-B8FC-AC1667EBCBE1}">
+              <a14:hiddenEffects xmlns:a14="http://schemas.microsoft.com/office/drawing/2010/main">
+                <a:effectLst>
+                  <a:outerShdw dist="35921" dir="2700000" algn="ctr" rotWithShape="0">
+                    <a:schemeClr val="bg2"/>
+                  </a:outerShdw>
+                </a:effectLst>
+              </a14:hiddenEffects>
+            </a:ext>
+          </a:extLst>
+        </p:spPr>
+        <p:txBody>
+          <a:bodyPr vert="horz" wrap="square" lIns="91440" tIns="45720" rIns="91440" bIns="45720" numCol="1" anchor="ctr" anchorCtr="0" compatLnSpc="1">
+            <a:prstTxWarp prst="textNoShape">
+              <a:avLst/>
+            </a:prstTxWarp>
+            <a:spAutoFit/>
+          </a:bodyPr>
+          <a:lstStyle/>
+          <a:p>
+            <a:pPr marL="0" marR="0" lvl="0" indent="0" algn="l" defTabSz="914400" rtl="0" eaLnBrk="0" fontAlgn="base" latinLnBrk="0" hangingPunct="0">
+              <a:lnSpc>
+                <a:spcPct val="100000"/>
+              </a:lnSpc>
+              <a:spcBef>
+                <a:spcPct val="0"/>
+              </a:spcBef>
+              <a:spcAft>
+                <a:spcPct val="0"/>
+              </a:spcAft>
+              <a:buClrTx/>
+              <a:buSzTx/>
+              <a:buFontTx/>
+              <a:buNone/>
+              <a:tabLst/>
+            </a:pPr>
+            <a:r>
+              <a:rPr kumimoji="0" lang="en-US" altLang="en-US" sz="2400" b="0" i="0" u="none" strike="noStrike" cap="none" normalizeH="0" baseline="0" dirty="0">
+                <a:ln>
+                  <a:noFill/>
+                </a:ln>
+                <a:solidFill>
+                  <a:srgbClr val="9876AA"/>
+                </a:solidFill>
+                <a:effectLst/>
+                <a:latin typeface="JetBrains Mono"/>
+              </a:rPr>
+              <a:t>"dev"</a:t>
+            </a:r>
+            <a:r>
+              <a:rPr kumimoji="0" lang="en-US" altLang="en-US" sz="2400" b="0" i="0" u="none" strike="noStrike" cap="none" normalizeH="0" baseline="0" dirty="0">
+                <a:ln>
+                  <a:noFill/>
+                </a:ln>
+                <a:solidFill>
+                  <a:srgbClr val="CC7832"/>
+                </a:solidFill>
+                <a:effectLst/>
+                <a:latin typeface="JetBrains Mono"/>
+              </a:rPr>
+              <a:t>: </a:t>
+            </a:r>
+            <a:r>
+              <a:rPr kumimoji="0" lang="en-US" altLang="en-US" sz="2400" b="0" i="0" u="none" strike="noStrike" cap="none" normalizeH="0" baseline="0" dirty="0">
+                <a:ln>
+                  <a:noFill/>
+                </a:ln>
+                <a:solidFill>
+                  <a:srgbClr val="6A8759"/>
+                </a:solidFill>
+                <a:effectLst/>
+                <a:latin typeface="JetBrains Mono"/>
+              </a:rPr>
+              <a:t>"concurrently </a:t>
+            </a:r>
+            <a:r>
+              <a:rPr kumimoji="0" lang="en-US" altLang="en-US" sz="2400" b="0" i="0" u="none" strike="noStrike" cap="none" normalizeH="0" baseline="0" dirty="0">
+                <a:ln>
+                  <a:noFill/>
+                </a:ln>
+                <a:solidFill>
+                  <a:srgbClr val="CC7832"/>
+                </a:solidFill>
+                <a:effectLst/>
+                <a:latin typeface="JetBrains Mono"/>
+              </a:rPr>
+              <a:t>\"</a:t>
+            </a:r>
+            <a:r>
+              <a:rPr kumimoji="0" lang="en-US" altLang="en-US" sz="2400" b="0" i="0" u="none" strike="noStrike" cap="none" normalizeH="0" baseline="0" dirty="0">
+                <a:ln>
+                  <a:noFill/>
+                </a:ln>
+                <a:solidFill>
+                  <a:srgbClr val="6A8759"/>
+                </a:solidFill>
+                <a:effectLst/>
+                <a:latin typeface="JetBrains Mono"/>
+              </a:rPr>
+              <a:t>yarn </a:t>
+            </a:r>
+            <a:r>
+              <a:rPr kumimoji="0" lang="en-US" altLang="en-US" sz="2400" b="0" i="0" u="none" strike="noStrike" cap="none" normalizeH="0" baseline="0" dirty="0" err="1">
+                <a:ln>
+                  <a:noFill/>
+                </a:ln>
+                <a:solidFill>
+                  <a:srgbClr val="6A8759"/>
+                </a:solidFill>
+                <a:effectLst/>
+                <a:latin typeface="JetBrains Mono"/>
+              </a:rPr>
+              <a:t>watch:client</a:t>
+            </a:r>
+            <a:r>
+              <a:rPr kumimoji="0" lang="en-US" altLang="en-US" sz="2400" b="0" i="0" u="none" strike="noStrike" cap="none" normalizeH="0" baseline="0" dirty="0">
+                <a:ln>
+                  <a:noFill/>
+                </a:ln>
+                <a:solidFill>
+                  <a:srgbClr val="CC7832"/>
+                </a:solidFill>
+                <a:effectLst/>
+                <a:latin typeface="JetBrains Mono"/>
+              </a:rPr>
+              <a:t>\" \"</a:t>
+            </a:r>
+            <a:r>
+              <a:rPr kumimoji="0" lang="en-US" altLang="en-US" sz="2400" b="0" i="0" u="none" strike="noStrike" cap="none" normalizeH="0" baseline="0" dirty="0">
+                <a:ln>
+                  <a:noFill/>
+                </a:ln>
+                <a:solidFill>
+                  <a:srgbClr val="6A8759"/>
+                </a:solidFill>
+                <a:effectLst/>
+                <a:latin typeface="JetBrains Mono"/>
+              </a:rPr>
+              <a:t>yarn </a:t>
+            </a:r>
+            <a:r>
+              <a:rPr kumimoji="0" lang="en-US" altLang="en-US" sz="2400" b="0" i="0" u="none" strike="noStrike" cap="none" normalizeH="0" baseline="0" dirty="0" err="1">
+                <a:ln>
+                  <a:noFill/>
+                </a:ln>
+                <a:solidFill>
+                  <a:srgbClr val="6A8759"/>
+                </a:solidFill>
+                <a:effectLst/>
+                <a:latin typeface="JetBrains Mono"/>
+              </a:rPr>
+              <a:t>watch:server</a:t>
+            </a:r>
+            <a:r>
+              <a:rPr kumimoji="0" lang="en-US" altLang="en-US" sz="2400" b="0" i="0" u="none" strike="noStrike" cap="none" normalizeH="0" baseline="0" dirty="0">
+                <a:ln>
+                  <a:noFill/>
+                </a:ln>
+                <a:solidFill>
+                  <a:srgbClr val="CC7832"/>
+                </a:solidFill>
+                <a:effectLst/>
+                <a:latin typeface="JetBrains Mono"/>
+              </a:rPr>
+              <a:t>\"</a:t>
+            </a:r>
+            <a:r>
+              <a:rPr kumimoji="0" lang="en-US" altLang="en-US" sz="2400" b="0" i="0" u="none" strike="noStrike" cap="none" normalizeH="0" baseline="0" dirty="0">
+                <a:ln>
+                  <a:noFill/>
+                </a:ln>
+                <a:solidFill>
+                  <a:srgbClr val="6A8759"/>
+                </a:solidFill>
+                <a:effectLst/>
+                <a:latin typeface="JetBrains Mono"/>
+              </a:rPr>
+              <a:t>"</a:t>
+            </a:r>
+            <a:r>
+              <a:rPr kumimoji="0" lang="en-US" altLang="en-US" sz="2400" b="0" i="0" u="none" strike="noStrike" cap="none" normalizeH="0" baseline="0" dirty="0">
+                <a:ln>
+                  <a:noFill/>
+                </a:ln>
+                <a:solidFill>
+                  <a:srgbClr val="CC7832"/>
+                </a:solidFill>
+                <a:effectLst/>
+                <a:latin typeface="JetBrains Mono"/>
+              </a:rPr>
+              <a:t>,</a:t>
+            </a:r>
+            <a:br>
+              <a:rPr kumimoji="0" lang="en-US" altLang="en-US" sz="2400" b="0" i="0" u="none" strike="noStrike" cap="none" normalizeH="0" baseline="0" dirty="0">
+                <a:ln>
+                  <a:noFill/>
+                </a:ln>
+                <a:solidFill>
+                  <a:srgbClr val="CC7832"/>
+                </a:solidFill>
+                <a:effectLst/>
+                <a:latin typeface="JetBrains Mono"/>
+              </a:rPr>
+            </a:br>
+            <a:r>
+              <a:rPr kumimoji="0" lang="en-US" altLang="en-US" sz="2400" b="0" i="0" u="none" strike="noStrike" cap="none" normalizeH="0" baseline="0" dirty="0">
+                <a:ln>
+                  <a:noFill/>
+                </a:ln>
+                <a:solidFill>
+                  <a:srgbClr val="9876AA"/>
+                </a:solidFill>
+                <a:effectLst/>
+                <a:latin typeface="JetBrains Mono"/>
+              </a:rPr>
+              <a:t>"</a:t>
+            </a:r>
+            <a:r>
+              <a:rPr kumimoji="0" lang="en-US" altLang="en-US" sz="2400" b="0" i="0" u="none" strike="noStrike" cap="none" normalizeH="0" baseline="0" dirty="0" err="1">
+                <a:ln>
+                  <a:noFill/>
+                </a:ln>
+                <a:solidFill>
+                  <a:srgbClr val="9876AA"/>
+                </a:solidFill>
+                <a:effectLst/>
+                <a:latin typeface="JetBrains Mono"/>
+              </a:rPr>
+              <a:t>watch:client</a:t>
+            </a:r>
+            <a:r>
+              <a:rPr kumimoji="0" lang="en-US" altLang="en-US" sz="2400" b="0" i="0" u="none" strike="noStrike" cap="none" normalizeH="0" baseline="0" dirty="0">
+                <a:ln>
+                  <a:noFill/>
+                </a:ln>
+                <a:solidFill>
+                  <a:srgbClr val="9876AA"/>
+                </a:solidFill>
+                <a:effectLst/>
+                <a:latin typeface="JetBrains Mono"/>
+              </a:rPr>
+              <a:t>"</a:t>
+            </a:r>
+            <a:r>
+              <a:rPr kumimoji="0" lang="en-US" altLang="en-US" sz="2400" b="0" i="0" u="none" strike="noStrike" cap="none" normalizeH="0" baseline="0" dirty="0">
+                <a:ln>
+                  <a:noFill/>
+                </a:ln>
+                <a:solidFill>
+                  <a:srgbClr val="CC7832"/>
+                </a:solidFill>
+                <a:effectLst/>
+                <a:latin typeface="JetBrains Mono"/>
+              </a:rPr>
+              <a:t>: </a:t>
+            </a:r>
+            <a:r>
+              <a:rPr kumimoji="0" lang="en-US" altLang="en-US" sz="2400" b="0" i="0" u="none" strike="noStrike" cap="none" normalizeH="0" baseline="0" dirty="0">
+                <a:ln>
+                  <a:noFill/>
+                </a:ln>
+                <a:solidFill>
+                  <a:srgbClr val="6A8759"/>
+                </a:solidFill>
+                <a:effectLst/>
+                <a:latin typeface="JetBrains Mono"/>
+              </a:rPr>
+              <a:t>"webpack --watch --mode development"</a:t>
+            </a:r>
+            <a:r>
+              <a:rPr kumimoji="0" lang="en-US" altLang="en-US" sz="2400" b="0" i="0" u="none" strike="noStrike" cap="none" normalizeH="0" baseline="0" dirty="0">
+                <a:ln>
+                  <a:noFill/>
+                </a:ln>
+                <a:solidFill>
+                  <a:srgbClr val="CC7832"/>
+                </a:solidFill>
+                <a:effectLst/>
+                <a:latin typeface="JetBrains Mono"/>
+              </a:rPr>
+              <a:t>,</a:t>
+            </a:r>
+            <a:br>
+              <a:rPr kumimoji="0" lang="en-US" altLang="en-US" sz="2400" b="0" i="0" u="none" strike="noStrike" cap="none" normalizeH="0" baseline="0" dirty="0">
+                <a:ln>
+                  <a:noFill/>
+                </a:ln>
+                <a:solidFill>
+                  <a:srgbClr val="CC7832"/>
+                </a:solidFill>
+                <a:effectLst/>
+                <a:latin typeface="JetBrains Mono"/>
+              </a:rPr>
+            </a:br>
+            <a:r>
+              <a:rPr kumimoji="0" lang="en-US" altLang="en-US" sz="2400" b="0" i="0" u="none" strike="noStrike" cap="none" normalizeH="0" baseline="0" dirty="0">
+                <a:ln>
+                  <a:noFill/>
+                </a:ln>
+                <a:solidFill>
+                  <a:srgbClr val="9876AA"/>
+                </a:solidFill>
+                <a:effectLst/>
+                <a:latin typeface="JetBrains Mono"/>
+              </a:rPr>
+              <a:t>"</a:t>
+            </a:r>
+            <a:r>
+              <a:rPr kumimoji="0" lang="en-US" altLang="en-US" sz="2400" b="0" i="0" u="none" strike="noStrike" cap="none" normalizeH="0" baseline="0" dirty="0" err="1">
+                <a:ln>
+                  <a:noFill/>
+                </a:ln>
+                <a:solidFill>
+                  <a:srgbClr val="9876AA"/>
+                </a:solidFill>
+                <a:effectLst/>
+                <a:latin typeface="JetBrains Mono"/>
+              </a:rPr>
+              <a:t>watch:server</a:t>
+            </a:r>
+            <a:r>
+              <a:rPr kumimoji="0" lang="en-US" altLang="en-US" sz="2400" b="0" i="0" u="none" strike="noStrike" cap="none" normalizeH="0" baseline="0" dirty="0">
+                <a:ln>
+                  <a:noFill/>
+                </a:ln>
+                <a:solidFill>
+                  <a:srgbClr val="9876AA"/>
+                </a:solidFill>
+                <a:effectLst/>
+                <a:latin typeface="JetBrains Mono"/>
+              </a:rPr>
+              <a:t>"</a:t>
+            </a:r>
+            <a:r>
+              <a:rPr kumimoji="0" lang="en-US" altLang="en-US" sz="2400" b="0" i="0" u="none" strike="noStrike" cap="none" normalizeH="0" baseline="0" dirty="0">
+                <a:ln>
+                  <a:noFill/>
+                </a:ln>
+                <a:solidFill>
+                  <a:srgbClr val="CC7832"/>
+                </a:solidFill>
+                <a:effectLst/>
+                <a:latin typeface="JetBrains Mono"/>
+              </a:rPr>
+              <a:t>: </a:t>
+            </a:r>
+            <a:r>
+              <a:rPr kumimoji="0" lang="en-US" altLang="en-US" sz="2400" b="0" i="0" u="none" strike="noStrike" cap="none" normalizeH="0" baseline="0" dirty="0">
+                <a:ln>
+                  <a:noFill/>
+                </a:ln>
+                <a:solidFill>
+                  <a:srgbClr val="6A8759"/>
+                </a:solidFill>
+                <a:effectLst/>
+                <a:latin typeface="JetBrains Mono"/>
+              </a:rPr>
+              <a:t>"</a:t>
+            </a:r>
+            <a:r>
+              <a:rPr kumimoji="0" lang="en-US" altLang="en-US" sz="2400" b="0" i="0" u="none" strike="noStrike" cap="none" normalizeH="0" baseline="0" dirty="0" err="1">
+                <a:ln>
+                  <a:noFill/>
+                </a:ln>
+                <a:solidFill>
+                  <a:srgbClr val="6A8759"/>
+                </a:solidFill>
+                <a:effectLst/>
+                <a:latin typeface="JetBrains Mono"/>
+              </a:rPr>
+              <a:t>nodemon</a:t>
+            </a:r>
+            <a:r>
+              <a:rPr kumimoji="0" lang="en-US" altLang="en-US" sz="2400" b="0" i="0" u="none" strike="noStrike" cap="none" normalizeH="0" baseline="0" dirty="0">
+                <a:ln>
+                  <a:noFill/>
+                </a:ln>
+                <a:solidFill>
+                  <a:srgbClr val="6A8759"/>
+                </a:solidFill>
+                <a:effectLst/>
+                <a:latin typeface="JetBrains Mono"/>
+              </a:rPr>
+              <a:t> </a:t>
+            </a:r>
+            <a:r>
+              <a:rPr kumimoji="0" lang="en-US" altLang="en-US" sz="2400" b="0" i="0" u="none" strike="noStrike" cap="none" normalizeH="0" baseline="0" dirty="0" err="1">
+                <a:ln>
+                  <a:noFill/>
+                </a:ln>
+                <a:solidFill>
+                  <a:srgbClr val="6A8759"/>
+                </a:solidFill>
+                <a:effectLst/>
+                <a:latin typeface="JetBrains Mono"/>
+              </a:rPr>
+              <a:t>src</a:t>
+            </a:r>
+            <a:r>
+              <a:rPr kumimoji="0" lang="en-US" altLang="en-US" sz="2400" b="0" i="0" u="none" strike="noStrike" cap="none" normalizeH="0" baseline="0" dirty="0">
+                <a:ln>
+                  <a:noFill/>
+                </a:ln>
+                <a:solidFill>
+                  <a:srgbClr val="6A8759"/>
+                </a:solidFill>
+                <a:effectLst/>
+                <a:latin typeface="JetBrains Mono"/>
+              </a:rPr>
+              <a:t>/server/server.js --watch </a:t>
+            </a:r>
+            <a:r>
+              <a:rPr kumimoji="0" lang="en-US" altLang="en-US" sz="2400" b="0" i="0" u="none" strike="noStrike" cap="none" normalizeH="0" baseline="0" dirty="0" err="1">
+                <a:ln>
+                  <a:noFill/>
+                </a:ln>
+                <a:solidFill>
+                  <a:srgbClr val="6A8759"/>
+                </a:solidFill>
+                <a:effectLst/>
+                <a:latin typeface="JetBrains Mono"/>
+              </a:rPr>
+              <a:t>src</a:t>
+            </a:r>
+            <a:r>
+              <a:rPr kumimoji="0" lang="en-US" altLang="en-US" sz="2400" b="0" i="0" u="none" strike="noStrike" cap="none" normalizeH="0" baseline="0" dirty="0">
+                <a:ln>
+                  <a:noFill/>
+                </a:ln>
+                <a:solidFill>
+                  <a:srgbClr val="6A8759"/>
+                </a:solidFill>
+                <a:effectLst/>
+                <a:latin typeface="JetBrains Mono"/>
+              </a:rPr>
+              <a:t>/server --watch public/bundle.js"</a:t>
+            </a:r>
+            <a:endParaRPr kumimoji="0" lang="en-US" altLang="en-US" sz="2400" b="0" i="0" u="none" strike="noStrike" cap="none" normalizeH="0" baseline="0" dirty="0">
+              <a:ln>
+                <a:noFill/>
+              </a:ln>
+              <a:solidFill>
+                <a:schemeClr val="tx1"/>
+              </a:solidFill>
+              <a:effectLst/>
+              <a:latin typeface="Arial" panose="020B0604020202020204" pitchFamily="34" charset="0"/>
+            </a:endParaRPr>
+          </a:p>
+        </p:txBody>
+      </p:sp>
+    </p:spTree>
+    <p:extLst>
+      <p:ext uri="{BB962C8B-B14F-4D97-AF65-F5344CB8AC3E}">
+        <p14:creationId xmlns:p14="http://schemas.microsoft.com/office/powerpoint/2010/main" val="131239533"/>
+      </p:ext>
+    </p:extLst>
+  </p:cSld>
+  <p:clrMapOvr>
+    <a:masterClrMapping/>
+  </p:clrMapOvr>
+</p:sld>
+</file>
+
+<file path=ppt/slides/slide9.xml><?xml version="1.0" encoding="utf-8"?>
+<p:sld xmlns:a="http://schemas.openxmlformats.org/drawingml/2006/main" xmlns:r="http://schemas.openxmlformats.org/officeDocument/2006/relationships" xmlns:p="http://schemas.openxmlformats.org/presentationml/2006/main">
+  <p:cSld>
+    <p:spTree>
+      <p:nvGrpSpPr>
+        <p:cNvPr id="1" name=""/>
+        <p:cNvGrpSpPr/>
+        <p:nvPr/>
+      </p:nvGrpSpPr>
+      <p:grpSpPr>
+        <a:xfrm>
+          <a:off x="0" y="0"/>
+          <a:ext cx="0" cy="0"/>
+          <a:chOff x="0" y="0"/>
+          <a:chExt cx="0" cy="0"/>
+        </a:xfrm>
+      </p:grpSpPr>
+      <p:sp>
+        <p:nvSpPr>
+          <p:cNvPr id="2" name="Title 1">
+            <a:extLst>
+              <a:ext uri="{FF2B5EF4-FFF2-40B4-BE49-F238E27FC236}">
+                <a16:creationId xmlns:a16="http://schemas.microsoft.com/office/drawing/2014/main" id="{62B0E0AC-11E8-4B69-BD2A-F194A8A660BE}"/>
+              </a:ext>
+            </a:extLst>
+          </p:cNvPr>
+          <p:cNvSpPr>
+            <a:spLocks noGrp="1"/>
+          </p:cNvSpPr>
+          <p:nvPr>
+            <p:ph type="title"/>
+          </p:nvPr>
+        </p:nvSpPr>
+        <p:spPr/>
+        <p:txBody>
+          <a:bodyPr/>
+          <a:lstStyle/>
+          <a:p>
+            <a:r>
+              <a:rPr lang="en-US" dirty="0"/>
+              <a:t>Testing a REST API</a:t>
+            </a:r>
+          </a:p>
+        </p:txBody>
+      </p:sp>
+      <p:sp>
+        <p:nvSpPr>
+          <p:cNvPr id="3" name="Content Placeholder 2">
+            <a:extLst>
+              <a:ext uri="{FF2B5EF4-FFF2-40B4-BE49-F238E27FC236}">
+                <a16:creationId xmlns:a16="http://schemas.microsoft.com/office/drawing/2014/main" id="{30BF3D84-AFC1-4DC3-9EE5-7044A364F56E}"/>
+              </a:ext>
+            </a:extLst>
+          </p:cNvPr>
+          <p:cNvSpPr>
+            <a:spLocks noGrp="1"/>
+          </p:cNvSpPr>
+          <p:nvPr>
+            <p:ph idx="1"/>
+          </p:nvPr>
+        </p:nvSpPr>
+        <p:spPr>
+          <a:xfrm>
+            <a:off x="183823" y="1825624"/>
+            <a:ext cx="11759938" cy="4857979"/>
+          </a:xfrm>
+        </p:spPr>
+        <p:txBody>
+          <a:bodyPr/>
+          <a:lstStyle/>
+          <a:p>
+            <a:r>
+              <a:rPr lang="en-US" dirty="0"/>
+              <a:t>Can of course write </a:t>
+            </a:r>
+            <a:r>
+              <a:rPr lang="en-US" i="1" dirty="0"/>
+              <a:t>Unit Tests</a:t>
+            </a:r>
+            <a:r>
+              <a:rPr lang="en-US" dirty="0"/>
+              <a:t> </a:t>
+            </a:r>
+          </a:p>
+          <a:p>
+            <a:r>
+              <a:rPr lang="en-US" dirty="0"/>
+              <a:t>But also good to write “</a:t>
+            </a:r>
+            <a:r>
+              <a:rPr lang="en-US" i="1" dirty="0"/>
+              <a:t>System Tests</a:t>
+            </a:r>
+            <a:r>
+              <a:rPr lang="en-US" dirty="0"/>
+              <a:t>”</a:t>
+            </a:r>
+          </a:p>
+          <a:p>
+            <a:r>
+              <a:rPr lang="en-US" dirty="0"/>
+              <a:t>In case of REST, we start the HTTP server, and from test cases, execute HTTP calls over TCP</a:t>
+            </a:r>
+          </a:p>
+          <a:p>
+            <a:pPr lvl="1"/>
+            <a:r>
+              <a:rPr lang="en-US" dirty="0"/>
+              <a:t>and then write assertions on the returned HTTP responses</a:t>
+            </a:r>
+          </a:p>
+        </p:txBody>
+      </p:sp>
+    </p:spTree>
+    <p:extLst>
+      <p:ext uri="{BB962C8B-B14F-4D97-AF65-F5344CB8AC3E}">
+        <p14:creationId xmlns:p14="http://schemas.microsoft.com/office/powerpoint/2010/main" val="2497493730"/>
       </p:ext>
     </p:extLst>
   </p:cSld>

</xml_diff>